<commit_message>
added README file and replaced files in project 2
</commit_message>
<xml_diff>
--- a/Project 3 - Design a School Recruitment Database System - Semester 2 _year 2/DependencyTable_Question2.pptx
+++ b/Project 3 - Design a School Recruitment Database System - Semester 2 _year 2/DependencyTable_Question2.pptx
@@ -5,8 +5,13 @@
     <p:sldMasterId id="2147483648" r:id="rId1"/>
   </p:sldMasterIdLst>
   <p:sldIdLst>
-    <p:sldId id="258" r:id="rId2"/>
-    <p:sldId id="259" r:id="rId3"/>
+    <p:sldId id="262" r:id="rId2"/>
+    <p:sldId id="263" r:id="rId3"/>
+    <p:sldId id="264" r:id="rId4"/>
+    <p:sldId id="258" r:id="rId5"/>
+    <p:sldId id="260" r:id="rId6"/>
+    <p:sldId id="261" r:id="rId7"/>
+    <p:sldId id="259" r:id="rId8"/>
   </p:sldIdLst>
   <p:sldSz cx="12192000" cy="6858000"/>
   <p:notesSz cx="6858000" cy="9144000"/>
@@ -260,7 +265,7 @@
           <a:p>
             <a:fld id="{A69BE190-A25B-4FFE-A7B9-84B84909C9A9}" type="datetimeFigureOut">
               <a:rPr lang="en-GB" smtClean="0"/>
-              <a:t>26/10/2023</a:t>
+              <a:t>27/10/2023</a:t>
             </a:fld>
             <a:endParaRPr lang="en-GB"/>
           </a:p>
@@ -458,7 +463,7 @@
           <a:p>
             <a:fld id="{A69BE190-A25B-4FFE-A7B9-84B84909C9A9}" type="datetimeFigureOut">
               <a:rPr lang="en-GB" smtClean="0"/>
-              <a:t>26/10/2023</a:t>
+              <a:t>27/10/2023</a:t>
             </a:fld>
             <a:endParaRPr lang="en-GB"/>
           </a:p>
@@ -666,7 +671,7 @@
           <a:p>
             <a:fld id="{A69BE190-A25B-4FFE-A7B9-84B84909C9A9}" type="datetimeFigureOut">
               <a:rPr lang="en-GB" smtClean="0"/>
-              <a:t>26/10/2023</a:t>
+              <a:t>27/10/2023</a:t>
             </a:fld>
             <a:endParaRPr lang="en-GB"/>
           </a:p>
@@ -864,7 +869,7 @@
           <a:p>
             <a:fld id="{A69BE190-A25B-4FFE-A7B9-84B84909C9A9}" type="datetimeFigureOut">
               <a:rPr lang="en-GB" smtClean="0"/>
-              <a:t>26/10/2023</a:t>
+              <a:t>27/10/2023</a:t>
             </a:fld>
             <a:endParaRPr lang="en-GB"/>
           </a:p>
@@ -1139,7 +1144,7 @@
           <a:p>
             <a:fld id="{A69BE190-A25B-4FFE-A7B9-84B84909C9A9}" type="datetimeFigureOut">
               <a:rPr lang="en-GB" smtClean="0"/>
-              <a:t>26/10/2023</a:t>
+              <a:t>27/10/2023</a:t>
             </a:fld>
             <a:endParaRPr lang="en-GB"/>
           </a:p>
@@ -1404,7 +1409,7 @@
           <a:p>
             <a:fld id="{A69BE190-A25B-4FFE-A7B9-84B84909C9A9}" type="datetimeFigureOut">
               <a:rPr lang="en-GB" smtClean="0"/>
-              <a:t>26/10/2023</a:t>
+              <a:t>27/10/2023</a:t>
             </a:fld>
             <a:endParaRPr lang="en-GB"/>
           </a:p>
@@ -1816,7 +1821,7 @@
           <a:p>
             <a:fld id="{A69BE190-A25B-4FFE-A7B9-84B84909C9A9}" type="datetimeFigureOut">
               <a:rPr lang="en-GB" smtClean="0"/>
-              <a:t>26/10/2023</a:t>
+              <a:t>27/10/2023</a:t>
             </a:fld>
             <a:endParaRPr lang="en-GB"/>
           </a:p>
@@ -1957,7 +1962,7 @@
           <a:p>
             <a:fld id="{A69BE190-A25B-4FFE-A7B9-84B84909C9A9}" type="datetimeFigureOut">
               <a:rPr lang="en-GB" smtClean="0"/>
-              <a:t>26/10/2023</a:t>
+              <a:t>27/10/2023</a:t>
             </a:fld>
             <a:endParaRPr lang="en-GB"/>
           </a:p>
@@ -2070,7 +2075,7 @@
           <a:p>
             <a:fld id="{A69BE190-A25B-4FFE-A7B9-84B84909C9A9}" type="datetimeFigureOut">
               <a:rPr lang="en-GB" smtClean="0"/>
-              <a:t>26/10/2023</a:t>
+              <a:t>27/10/2023</a:t>
             </a:fld>
             <a:endParaRPr lang="en-GB"/>
           </a:p>
@@ -2381,7 +2386,7 @@
           <a:p>
             <a:fld id="{A69BE190-A25B-4FFE-A7B9-84B84909C9A9}" type="datetimeFigureOut">
               <a:rPr lang="en-GB" smtClean="0"/>
-              <a:t>26/10/2023</a:t>
+              <a:t>27/10/2023</a:t>
             </a:fld>
             <a:endParaRPr lang="en-GB"/>
           </a:p>
@@ -2669,7 +2674,7 @@
           <a:p>
             <a:fld id="{A69BE190-A25B-4FFE-A7B9-84B84909C9A9}" type="datetimeFigureOut">
               <a:rPr lang="en-GB" smtClean="0"/>
-              <a:t>26/10/2023</a:t>
+              <a:t>27/10/2023</a:t>
             </a:fld>
             <a:endParaRPr lang="en-GB"/>
           </a:p>
@@ -2910,7 +2915,7 @@
           <a:p>
             <a:fld id="{A69BE190-A25B-4FFE-A7B9-84B84909C9A9}" type="datetimeFigureOut">
               <a:rPr lang="en-GB" smtClean="0"/>
-              <a:t>26/10/2023</a:t>
+              <a:t>27/10/2023</a:t>
             </a:fld>
             <a:endParaRPr lang="en-GB"/>
           </a:p>
@@ -3329,6 +3334,1020 @@
       </p:grpSpPr>
       <p:pic>
         <p:nvPicPr>
+          <p:cNvPr id="3" name="Picture 2">
+            <a:extLst>
+              <a:ext uri="{FF2B5EF4-FFF2-40B4-BE49-F238E27FC236}">
+                <a16:creationId xmlns:a16="http://schemas.microsoft.com/office/drawing/2014/main" id="{7202534E-8148-2C69-B412-D19F16EB3D41}"/>
+              </a:ext>
+            </a:extLst>
+          </p:cNvPr>
+          <p:cNvPicPr>
+            <a:picLocks noChangeAspect="1"/>
+          </p:cNvPicPr>
+          <p:nvPr/>
+        </p:nvPicPr>
+        <p:blipFill>
+          <a:blip r:embed="rId2"/>
+          <a:stretch>
+            <a:fillRect/>
+          </a:stretch>
+        </p:blipFill>
+        <p:spPr>
+          <a:xfrm>
+            <a:off x="1333616" y="2473525"/>
+            <a:ext cx="8087854" cy="1552792"/>
+          </a:xfrm>
+          <a:prstGeom prst="rect">
+            <a:avLst/>
+          </a:prstGeom>
+        </p:spPr>
+      </p:pic>
+      <p:sp>
+        <p:nvSpPr>
+          <p:cNvPr id="8" name="Freeform: Shape 7">
+            <a:extLst>
+              <a:ext uri="{FF2B5EF4-FFF2-40B4-BE49-F238E27FC236}">
+                <a16:creationId xmlns:a16="http://schemas.microsoft.com/office/drawing/2014/main" id="{A7D0B4DB-FAE8-5A8A-7819-93E206F38B89}"/>
+              </a:ext>
+            </a:extLst>
+          </p:cNvPr>
+          <p:cNvSpPr/>
+          <p:nvPr/>
+        </p:nvSpPr>
+        <p:spPr>
+          <a:xfrm>
+            <a:off x="1929469" y="1946245"/>
+            <a:ext cx="6845415" cy="442519"/>
+          </a:xfrm>
+          <a:custGeom>
+            <a:avLst/>
+            <a:gdLst>
+              <a:gd name="connsiteX0" fmla="*/ 0 w 6845415"/>
+              <a:gd name="connsiteY0" fmla="*/ 0 h 694190"/>
+              <a:gd name="connsiteX1" fmla="*/ 176169 w 6845415"/>
+              <a:gd name="connsiteY1" fmla="*/ 0 h 694190"/>
+              <a:gd name="connsiteX2" fmla="*/ 3108235 w 6845415"/>
+              <a:gd name="connsiteY2" fmla="*/ 0 h 694190"/>
+              <a:gd name="connsiteX3" fmla="*/ 3236117 w 6845415"/>
+              <a:gd name="connsiteY3" fmla="*/ 0 h 694190"/>
+              <a:gd name="connsiteX4" fmla="*/ 6737028 w 6845415"/>
+              <a:gd name="connsiteY4" fmla="*/ 0 h 694190"/>
+              <a:gd name="connsiteX5" fmla="*/ 6737028 w 6845415"/>
+              <a:gd name="connsiteY5" fmla="*/ 520642 h 694190"/>
+              <a:gd name="connsiteX6" fmla="*/ 6845415 w 6845415"/>
+              <a:gd name="connsiteY6" fmla="*/ 520642 h 694190"/>
+              <a:gd name="connsiteX7" fmla="*/ 6671868 w 6845415"/>
+              <a:gd name="connsiteY7" fmla="*/ 694190 h 694190"/>
+              <a:gd name="connsiteX8" fmla="*/ 6498320 w 6845415"/>
+              <a:gd name="connsiteY8" fmla="*/ 520642 h 694190"/>
+              <a:gd name="connsiteX9" fmla="*/ 6606707 w 6845415"/>
+              <a:gd name="connsiteY9" fmla="*/ 520642 h 694190"/>
+              <a:gd name="connsiteX10" fmla="*/ 6606707 w 6845415"/>
+              <a:gd name="connsiteY10" fmla="*/ 130320 h 694190"/>
+              <a:gd name="connsiteX11" fmla="*/ 3236117 w 6845415"/>
+              <a:gd name="connsiteY11" fmla="*/ 130320 h 694190"/>
+              <a:gd name="connsiteX12" fmla="*/ 3236117 w 6845415"/>
+              <a:gd name="connsiteY12" fmla="*/ 520642 h 694190"/>
+              <a:gd name="connsiteX13" fmla="*/ 3347208 w 6845415"/>
+              <a:gd name="connsiteY13" fmla="*/ 520642 h 694190"/>
+              <a:gd name="connsiteX14" fmla="*/ 3173661 w 6845415"/>
+              <a:gd name="connsiteY14" fmla="*/ 694189 h 694190"/>
+              <a:gd name="connsiteX15" fmla="*/ 3000114 w 6845415"/>
+              <a:gd name="connsiteY15" fmla="*/ 520642 h 694190"/>
+              <a:gd name="connsiteX16" fmla="*/ 3111205 w 6845415"/>
+              <a:gd name="connsiteY16" fmla="*/ 520642 h 694190"/>
+              <a:gd name="connsiteX17" fmla="*/ 3111205 w 6845415"/>
+              <a:gd name="connsiteY17" fmla="*/ 130320 h 694190"/>
+              <a:gd name="connsiteX18" fmla="*/ 3108235 w 6845415"/>
+              <a:gd name="connsiteY18" fmla="*/ 130320 h 694190"/>
+              <a:gd name="connsiteX19" fmla="*/ 3108235 w 6845415"/>
+              <a:gd name="connsiteY19" fmla="*/ 124912 h 694190"/>
+              <a:gd name="connsiteX20" fmla="*/ 176169 w 6845415"/>
+              <a:gd name="connsiteY20" fmla="*/ 124912 h 694190"/>
+              <a:gd name="connsiteX21" fmla="*/ 176169 w 6845415"/>
+              <a:gd name="connsiteY21" fmla="*/ 694190 h 694190"/>
+              <a:gd name="connsiteX22" fmla="*/ 0 w 6845415"/>
+              <a:gd name="connsiteY22" fmla="*/ 694190 h 694190"/>
+              <a:gd name="connsiteX23" fmla="*/ 0 w 6845415"/>
+              <a:gd name="connsiteY23" fmla="*/ 124912 h 694190"/>
+            </a:gdLst>
+            <a:ahLst/>
+            <a:cxnLst>
+              <a:cxn ang="0">
+                <a:pos x="connsiteX0" y="connsiteY0"/>
+              </a:cxn>
+              <a:cxn ang="0">
+                <a:pos x="connsiteX1" y="connsiteY1"/>
+              </a:cxn>
+              <a:cxn ang="0">
+                <a:pos x="connsiteX2" y="connsiteY2"/>
+              </a:cxn>
+              <a:cxn ang="0">
+                <a:pos x="connsiteX3" y="connsiteY3"/>
+              </a:cxn>
+              <a:cxn ang="0">
+                <a:pos x="connsiteX4" y="connsiteY4"/>
+              </a:cxn>
+              <a:cxn ang="0">
+                <a:pos x="connsiteX5" y="connsiteY5"/>
+              </a:cxn>
+              <a:cxn ang="0">
+                <a:pos x="connsiteX6" y="connsiteY6"/>
+              </a:cxn>
+              <a:cxn ang="0">
+                <a:pos x="connsiteX7" y="connsiteY7"/>
+              </a:cxn>
+              <a:cxn ang="0">
+                <a:pos x="connsiteX8" y="connsiteY8"/>
+              </a:cxn>
+              <a:cxn ang="0">
+                <a:pos x="connsiteX9" y="connsiteY9"/>
+              </a:cxn>
+              <a:cxn ang="0">
+                <a:pos x="connsiteX10" y="connsiteY10"/>
+              </a:cxn>
+              <a:cxn ang="0">
+                <a:pos x="connsiteX11" y="connsiteY11"/>
+              </a:cxn>
+              <a:cxn ang="0">
+                <a:pos x="connsiteX12" y="connsiteY12"/>
+              </a:cxn>
+              <a:cxn ang="0">
+                <a:pos x="connsiteX13" y="connsiteY13"/>
+              </a:cxn>
+              <a:cxn ang="0">
+                <a:pos x="connsiteX14" y="connsiteY14"/>
+              </a:cxn>
+              <a:cxn ang="0">
+                <a:pos x="connsiteX15" y="connsiteY15"/>
+              </a:cxn>
+              <a:cxn ang="0">
+                <a:pos x="connsiteX16" y="connsiteY16"/>
+              </a:cxn>
+              <a:cxn ang="0">
+                <a:pos x="connsiteX17" y="connsiteY17"/>
+              </a:cxn>
+              <a:cxn ang="0">
+                <a:pos x="connsiteX18" y="connsiteY18"/>
+              </a:cxn>
+              <a:cxn ang="0">
+                <a:pos x="connsiteX19" y="connsiteY19"/>
+              </a:cxn>
+              <a:cxn ang="0">
+                <a:pos x="connsiteX20" y="connsiteY20"/>
+              </a:cxn>
+              <a:cxn ang="0">
+                <a:pos x="connsiteX21" y="connsiteY21"/>
+              </a:cxn>
+              <a:cxn ang="0">
+                <a:pos x="connsiteX22" y="connsiteY22"/>
+              </a:cxn>
+              <a:cxn ang="0">
+                <a:pos x="connsiteX23" y="connsiteY23"/>
+              </a:cxn>
+            </a:cxnLst>
+            <a:rect l="l" t="t" r="r" b="b"/>
+            <a:pathLst>
+              <a:path w="6845415" h="694190">
+                <a:moveTo>
+                  <a:pt x="0" y="0"/>
+                </a:moveTo>
+                <a:lnTo>
+                  <a:pt x="176169" y="0"/>
+                </a:lnTo>
+                <a:lnTo>
+                  <a:pt x="3108235" y="0"/>
+                </a:lnTo>
+                <a:lnTo>
+                  <a:pt x="3236117" y="0"/>
+                </a:lnTo>
+                <a:lnTo>
+                  <a:pt x="6737028" y="0"/>
+                </a:lnTo>
+                <a:lnTo>
+                  <a:pt x="6737028" y="520642"/>
+                </a:lnTo>
+                <a:lnTo>
+                  <a:pt x="6845415" y="520642"/>
+                </a:lnTo>
+                <a:lnTo>
+                  <a:pt x="6671868" y="694190"/>
+                </a:lnTo>
+                <a:lnTo>
+                  <a:pt x="6498320" y="520642"/>
+                </a:lnTo>
+                <a:lnTo>
+                  <a:pt x="6606707" y="520642"/>
+                </a:lnTo>
+                <a:lnTo>
+                  <a:pt x="6606707" y="130320"/>
+                </a:lnTo>
+                <a:lnTo>
+                  <a:pt x="3236117" y="130320"/>
+                </a:lnTo>
+                <a:lnTo>
+                  <a:pt x="3236117" y="520642"/>
+                </a:lnTo>
+                <a:lnTo>
+                  <a:pt x="3347208" y="520642"/>
+                </a:lnTo>
+                <a:lnTo>
+                  <a:pt x="3173661" y="694189"/>
+                </a:lnTo>
+                <a:lnTo>
+                  <a:pt x="3000114" y="520642"/>
+                </a:lnTo>
+                <a:lnTo>
+                  <a:pt x="3111205" y="520642"/>
+                </a:lnTo>
+                <a:lnTo>
+                  <a:pt x="3111205" y="130320"/>
+                </a:lnTo>
+                <a:lnTo>
+                  <a:pt x="3108235" y="130320"/>
+                </a:lnTo>
+                <a:lnTo>
+                  <a:pt x="3108235" y="124912"/>
+                </a:lnTo>
+                <a:lnTo>
+                  <a:pt x="176169" y="124912"/>
+                </a:lnTo>
+                <a:lnTo>
+                  <a:pt x="176169" y="694190"/>
+                </a:lnTo>
+                <a:lnTo>
+                  <a:pt x="0" y="694190"/>
+                </a:lnTo>
+                <a:lnTo>
+                  <a:pt x="0" y="124912"/>
+                </a:lnTo>
+                <a:close/>
+              </a:path>
+            </a:pathLst>
+          </a:custGeom>
+        </p:spPr>
+        <p:style>
+          <a:lnRef idx="2">
+            <a:schemeClr val="accent1">
+              <a:shade val="50000"/>
+            </a:schemeClr>
+          </a:lnRef>
+          <a:fillRef idx="1">
+            <a:schemeClr val="accent1"/>
+          </a:fillRef>
+          <a:effectRef idx="0">
+            <a:schemeClr val="accent1"/>
+          </a:effectRef>
+          <a:fontRef idx="minor">
+            <a:schemeClr val="lt1"/>
+          </a:fontRef>
+        </p:style>
+        <p:txBody>
+          <a:bodyPr wrap="square" rtlCol="0" anchor="ctr">
+            <a:noAutofit/>
+          </a:bodyPr>
+          <a:lstStyle/>
+          <a:p>
+            <a:pPr algn="ctr"/>
+            <a:endParaRPr lang="en-AU"/>
+          </a:p>
+        </p:txBody>
+      </p:sp>
+      <p:sp>
+        <p:nvSpPr>
+          <p:cNvPr id="10" name="Free-form: Shape 19">
+            <a:extLst>
+              <a:ext uri="{FF2B5EF4-FFF2-40B4-BE49-F238E27FC236}">
+                <a16:creationId xmlns:a16="http://schemas.microsoft.com/office/drawing/2014/main" id="{FB107855-EA25-6093-6295-E56370C8DB48}"/>
+              </a:ext>
+            </a:extLst>
+          </p:cNvPr>
+          <p:cNvSpPr/>
+          <p:nvPr/>
+        </p:nvSpPr>
+        <p:spPr>
+          <a:xfrm>
+            <a:off x="1929469" y="4111078"/>
+            <a:ext cx="2055103" cy="752651"/>
+          </a:xfrm>
+          <a:custGeom>
+            <a:avLst/>
+            <a:gdLst>
+              <a:gd name="connsiteX0" fmla="*/ 3024937 w 3213100"/>
+              <a:gd name="connsiteY0" fmla="*/ 0 h 752651"/>
+              <a:gd name="connsiteX1" fmla="*/ 3213100 w 3213100"/>
+              <a:gd name="connsiteY1" fmla="*/ 188163 h 752651"/>
+              <a:gd name="connsiteX2" fmla="*/ 3119019 w 3213100"/>
+              <a:gd name="connsiteY2" fmla="*/ 188163 h 752651"/>
+              <a:gd name="connsiteX3" fmla="*/ 3119019 w 3213100"/>
+              <a:gd name="connsiteY3" fmla="*/ 752651 h 752651"/>
+              <a:gd name="connsiteX4" fmla="*/ 228600 w 3213100"/>
+              <a:gd name="connsiteY4" fmla="*/ 752651 h 752651"/>
+              <a:gd name="connsiteX5" fmla="*/ 0 w 3213100"/>
+              <a:gd name="connsiteY5" fmla="*/ 752651 h 752651"/>
+              <a:gd name="connsiteX6" fmla="*/ 0 w 3213100"/>
+              <a:gd name="connsiteY6" fmla="*/ 564488 h 752651"/>
+              <a:gd name="connsiteX7" fmla="*/ 0 w 3213100"/>
+              <a:gd name="connsiteY7" fmla="*/ 79551 h 752651"/>
+              <a:gd name="connsiteX8" fmla="*/ 228600 w 3213100"/>
+              <a:gd name="connsiteY8" fmla="*/ 79551 h 752651"/>
+              <a:gd name="connsiteX9" fmla="*/ 228600 w 3213100"/>
+              <a:gd name="connsiteY9" fmla="*/ 564488 h 752651"/>
+              <a:gd name="connsiteX10" fmla="*/ 2930856 w 3213100"/>
+              <a:gd name="connsiteY10" fmla="*/ 564488 h 752651"/>
+              <a:gd name="connsiteX11" fmla="*/ 2930856 w 3213100"/>
+              <a:gd name="connsiteY11" fmla="*/ 188163 h 752651"/>
+              <a:gd name="connsiteX12" fmla="*/ 2836775 w 3213100"/>
+              <a:gd name="connsiteY12" fmla="*/ 188163 h 752651"/>
+            </a:gdLst>
+            <a:ahLst/>
+            <a:cxnLst>
+              <a:cxn ang="0">
+                <a:pos x="connsiteX0" y="connsiteY0"/>
+              </a:cxn>
+              <a:cxn ang="0">
+                <a:pos x="connsiteX1" y="connsiteY1"/>
+              </a:cxn>
+              <a:cxn ang="0">
+                <a:pos x="connsiteX2" y="connsiteY2"/>
+              </a:cxn>
+              <a:cxn ang="0">
+                <a:pos x="connsiteX3" y="connsiteY3"/>
+              </a:cxn>
+              <a:cxn ang="0">
+                <a:pos x="connsiteX4" y="connsiteY4"/>
+              </a:cxn>
+              <a:cxn ang="0">
+                <a:pos x="connsiteX5" y="connsiteY5"/>
+              </a:cxn>
+              <a:cxn ang="0">
+                <a:pos x="connsiteX6" y="connsiteY6"/>
+              </a:cxn>
+              <a:cxn ang="0">
+                <a:pos x="connsiteX7" y="connsiteY7"/>
+              </a:cxn>
+              <a:cxn ang="0">
+                <a:pos x="connsiteX8" y="connsiteY8"/>
+              </a:cxn>
+              <a:cxn ang="0">
+                <a:pos x="connsiteX9" y="connsiteY9"/>
+              </a:cxn>
+              <a:cxn ang="0">
+                <a:pos x="connsiteX10" y="connsiteY10"/>
+              </a:cxn>
+              <a:cxn ang="0">
+                <a:pos x="connsiteX11" y="connsiteY11"/>
+              </a:cxn>
+              <a:cxn ang="0">
+                <a:pos x="connsiteX12" y="connsiteY12"/>
+              </a:cxn>
+            </a:cxnLst>
+            <a:rect l="l" t="t" r="r" b="b"/>
+            <a:pathLst>
+              <a:path w="3213100" h="752651">
+                <a:moveTo>
+                  <a:pt x="3024937" y="0"/>
+                </a:moveTo>
+                <a:lnTo>
+                  <a:pt x="3213100" y="188163"/>
+                </a:lnTo>
+                <a:lnTo>
+                  <a:pt x="3119019" y="188163"/>
+                </a:lnTo>
+                <a:lnTo>
+                  <a:pt x="3119019" y="752651"/>
+                </a:lnTo>
+                <a:lnTo>
+                  <a:pt x="228600" y="752651"/>
+                </a:lnTo>
+                <a:lnTo>
+                  <a:pt x="0" y="752651"/>
+                </a:lnTo>
+                <a:lnTo>
+                  <a:pt x="0" y="564488"/>
+                </a:lnTo>
+                <a:lnTo>
+                  <a:pt x="0" y="79551"/>
+                </a:lnTo>
+                <a:lnTo>
+                  <a:pt x="228600" y="79551"/>
+                </a:lnTo>
+                <a:lnTo>
+                  <a:pt x="228600" y="564488"/>
+                </a:lnTo>
+                <a:lnTo>
+                  <a:pt x="2930856" y="564488"/>
+                </a:lnTo>
+                <a:lnTo>
+                  <a:pt x="2930856" y="188163"/>
+                </a:lnTo>
+                <a:lnTo>
+                  <a:pt x="2836775" y="188163"/>
+                </a:lnTo>
+                <a:close/>
+              </a:path>
+            </a:pathLst>
+          </a:custGeom>
+          <a:solidFill>
+            <a:schemeClr val="accent2">
+              <a:lumMod val="75000"/>
+            </a:schemeClr>
+          </a:solidFill>
+        </p:spPr>
+        <p:style>
+          <a:lnRef idx="2">
+            <a:schemeClr val="accent1">
+              <a:shade val="15000"/>
+            </a:schemeClr>
+          </a:lnRef>
+          <a:fillRef idx="1">
+            <a:schemeClr val="accent1"/>
+          </a:fillRef>
+          <a:effectRef idx="0">
+            <a:schemeClr val="accent1"/>
+          </a:effectRef>
+          <a:fontRef idx="minor">
+            <a:schemeClr val="lt1"/>
+          </a:fontRef>
+        </p:style>
+        <p:txBody>
+          <a:bodyPr wrap="square" rtlCol="0" anchor="ctr">
+            <a:noAutofit/>
+          </a:bodyPr>
+          <a:lstStyle/>
+          <a:p>
+            <a:pPr algn="ctr"/>
+            <a:endParaRPr lang="en-GB"/>
+          </a:p>
+        </p:txBody>
+      </p:sp>
+      <p:sp>
+        <p:nvSpPr>
+          <p:cNvPr id="11" name="Free-form: Shape 19">
+            <a:extLst>
+              <a:ext uri="{FF2B5EF4-FFF2-40B4-BE49-F238E27FC236}">
+                <a16:creationId xmlns:a16="http://schemas.microsoft.com/office/drawing/2014/main" id="{0BE21E3D-F829-C54F-7907-543132C44AC3}"/>
+              </a:ext>
+            </a:extLst>
+          </p:cNvPr>
+          <p:cNvSpPr/>
+          <p:nvPr/>
+        </p:nvSpPr>
+        <p:spPr>
+          <a:xfrm>
+            <a:off x="5068448" y="4111077"/>
+            <a:ext cx="2055103" cy="752651"/>
+          </a:xfrm>
+          <a:custGeom>
+            <a:avLst/>
+            <a:gdLst>
+              <a:gd name="connsiteX0" fmla="*/ 3024937 w 3213100"/>
+              <a:gd name="connsiteY0" fmla="*/ 0 h 752651"/>
+              <a:gd name="connsiteX1" fmla="*/ 3213100 w 3213100"/>
+              <a:gd name="connsiteY1" fmla="*/ 188163 h 752651"/>
+              <a:gd name="connsiteX2" fmla="*/ 3119019 w 3213100"/>
+              <a:gd name="connsiteY2" fmla="*/ 188163 h 752651"/>
+              <a:gd name="connsiteX3" fmla="*/ 3119019 w 3213100"/>
+              <a:gd name="connsiteY3" fmla="*/ 752651 h 752651"/>
+              <a:gd name="connsiteX4" fmla="*/ 228600 w 3213100"/>
+              <a:gd name="connsiteY4" fmla="*/ 752651 h 752651"/>
+              <a:gd name="connsiteX5" fmla="*/ 0 w 3213100"/>
+              <a:gd name="connsiteY5" fmla="*/ 752651 h 752651"/>
+              <a:gd name="connsiteX6" fmla="*/ 0 w 3213100"/>
+              <a:gd name="connsiteY6" fmla="*/ 564488 h 752651"/>
+              <a:gd name="connsiteX7" fmla="*/ 0 w 3213100"/>
+              <a:gd name="connsiteY7" fmla="*/ 79551 h 752651"/>
+              <a:gd name="connsiteX8" fmla="*/ 228600 w 3213100"/>
+              <a:gd name="connsiteY8" fmla="*/ 79551 h 752651"/>
+              <a:gd name="connsiteX9" fmla="*/ 228600 w 3213100"/>
+              <a:gd name="connsiteY9" fmla="*/ 564488 h 752651"/>
+              <a:gd name="connsiteX10" fmla="*/ 2930856 w 3213100"/>
+              <a:gd name="connsiteY10" fmla="*/ 564488 h 752651"/>
+              <a:gd name="connsiteX11" fmla="*/ 2930856 w 3213100"/>
+              <a:gd name="connsiteY11" fmla="*/ 188163 h 752651"/>
+              <a:gd name="connsiteX12" fmla="*/ 2836775 w 3213100"/>
+              <a:gd name="connsiteY12" fmla="*/ 188163 h 752651"/>
+            </a:gdLst>
+            <a:ahLst/>
+            <a:cxnLst>
+              <a:cxn ang="0">
+                <a:pos x="connsiteX0" y="connsiteY0"/>
+              </a:cxn>
+              <a:cxn ang="0">
+                <a:pos x="connsiteX1" y="connsiteY1"/>
+              </a:cxn>
+              <a:cxn ang="0">
+                <a:pos x="connsiteX2" y="connsiteY2"/>
+              </a:cxn>
+              <a:cxn ang="0">
+                <a:pos x="connsiteX3" y="connsiteY3"/>
+              </a:cxn>
+              <a:cxn ang="0">
+                <a:pos x="connsiteX4" y="connsiteY4"/>
+              </a:cxn>
+              <a:cxn ang="0">
+                <a:pos x="connsiteX5" y="connsiteY5"/>
+              </a:cxn>
+              <a:cxn ang="0">
+                <a:pos x="connsiteX6" y="connsiteY6"/>
+              </a:cxn>
+              <a:cxn ang="0">
+                <a:pos x="connsiteX7" y="connsiteY7"/>
+              </a:cxn>
+              <a:cxn ang="0">
+                <a:pos x="connsiteX8" y="connsiteY8"/>
+              </a:cxn>
+              <a:cxn ang="0">
+                <a:pos x="connsiteX9" y="connsiteY9"/>
+              </a:cxn>
+              <a:cxn ang="0">
+                <a:pos x="connsiteX10" y="connsiteY10"/>
+              </a:cxn>
+              <a:cxn ang="0">
+                <a:pos x="connsiteX11" y="connsiteY11"/>
+              </a:cxn>
+              <a:cxn ang="0">
+                <a:pos x="connsiteX12" y="connsiteY12"/>
+              </a:cxn>
+            </a:cxnLst>
+            <a:rect l="l" t="t" r="r" b="b"/>
+            <a:pathLst>
+              <a:path w="3213100" h="752651">
+                <a:moveTo>
+                  <a:pt x="3024937" y="0"/>
+                </a:moveTo>
+                <a:lnTo>
+                  <a:pt x="3213100" y="188163"/>
+                </a:lnTo>
+                <a:lnTo>
+                  <a:pt x="3119019" y="188163"/>
+                </a:lnTo>
+                <a:lnTo>
+                  <a:pt x="3119019" y="752651"/>
+                </a:lnTo>
+                <a:lnTo>
+                  <a:pt x="228600" y="752651"/>
+                </a:lnTo>
+                <a:lnTo>
+                  <a:pt x="0" y="752651"/>
+                </a:lnTo>
+                <a:lnTo>
+                  <a:pt x="0" y="564488"/>
+                </a:lnTo>
+                <a:lnTo>
+                  <a:pt x="0" y="79551"/>
+                </a:lnTo>
+                <a:lnTo>
+                  <a:pt x="228600" y="79551"/>
+                </a:lnTo>
+                <a:lnTo>
+                  <a:pt x="228600" y="564488"/>
+                </a:lnTo>
+                <a:lnTo>
+                  <a:pt x="2930856" y="564488"/>
+                </a:lnTo>
+                <a:lnTo>
+                  <a:pt x="2930856" y="188163"/>
+                </a:lnTo>
+                <a:lnTo>
+                  <a:pt x="2836775" y="188163"/>
+                </a:lnTo>
+                <a:close/>
+              </a:path>
+            </a:pathLst>
+          </a:custGeom>
+          <a:solidFill>
+            <a:schemeClr val="accent2">
+              <a:lumMod val="75000"/>
+            </a:schemeClr>
+          </a:solidFill>
+        </p:spPr>
+        <p:style>
+          <a:lnRef idx="2">
+            <a:schemeClr val="accent1">
+              <a:shade val="15000"/>
+            </a:schemeClr>
+          </a:lnRef>
+          <a:fillRef idx="1">
+            <a:schemeClr val="accent1"/>
+          </a:fillRef>
+          <a:effectRef idx="0">
+            <a:schemeClr val="accent1"/>
+          </a:effectRef>
+          <a:fontRef idx="minor">
+            <a:schemeClr val="lt1"/>
+          </a:fontRef>
+        </p:style>
+        <p:txBody>
+          <a:bodyPr wrap="square" rtlCol="0" anchor="ctr">
+            <a:noAutofit/>
+          </a:bodyPr>
+          <a:lstStyle/>
+          <a:p>
+            <a:pPr algn="ctr"/>
+            <a:endParaRPr lang="en-GB"/>
+          </a:p>
+        </p:txBody>
+      </p:sp>
+      <p:sp>
+        <p:nvSpPr>
+          <p:cNvPr id="12" name="TextBox 11">
+            <a:extLst>
+              <a:ext uri="{FF2B5EF4-FFF2-40B4-BE49-F238E27FC236}">
+                <a16:creationId xmlns:a16="http://schemas.microsoft.com/office/drawing/2014/main" id="{67FCAA43-8CAB-C0F6-6BBA-61756CBE3DB0}"/>
+              </a:ext>
+            </a:extLst>
+          </p:cNvPr>
+          <p:cNvSpPr txBox="1"/>
+          <p:nvPr/>
+        </p:nvSpPr>
+        <p:spPr>
+          <a:xfrm>
+            <a:off x="3775046" y="1568741"/>
+            <a:ext cx="1749197" cy="369332"/>
+          </a:xfrm>
+          <a:prstGeom prst="rect">
+            <a:avLst/>
+          </a:prstGeom>
+          <a:noFill/>
+        </p:spPr>
+        <p:txBody>
+          <a:bodyPr wrap="none" rtlCol="0">
+            <a:spAutoFit/>
+          </a:bodyPr>
+          <a:lstStyle/>
+          <a:p>
+            <a:r>
+              <a:rPr lang="en-AU" dirty="0"/>
+              <a:t>Full Dependency</a:t>
+            </a:r>
+          </a:p>
+        </p:txBody>
+      </p:sp>
+      <p:sp>
+        <p:nvSpPr>
+          <p:cNvPr id="13" name="TextBox 12">
+            <a:extLst>
+              <a:ext uri="{FF2B5EF4-FFF2-40B4-BE49-F238E27FC236}">
+                <a16:creationId xmlns:a16="http://schemas.microsoft.com/office/drawing/2014/main" id="{3362C8D2-422E-760F-8C79-E8911C8D6E7D}"/>
+              </a:ext>
+            </a:extLst>
+          </p:cNvPr>
+          <p:cNvSpPr txBox="1"/>
+          <p:nvPr/>
+        </p:nvSpPr>
+        <p:spPr>
+          <a:xfrm>
+            <a:off x="1929469" y="4964724"/>
+            <a:ext cx="2013565" cy="369332"/>
+          </a:xfrm>
+          <a:prstGeom prst="rect">
+            <a:avLst/>
+          </a:prstGeom>
+          <a:noFill/>
+        </p:spPr>
+        <p:txBody>
+          <a:bodyPr wrap="none" rtlCol="0">
+            <a:spAutoFit/>
+          </a:bodyPr>
+          <a:lstStyle/>
+          <a:p>
+            <a:r>
+              <a:rPr lang="en-AU" dirty="0"/>
+              <a:t>Partial Dependency</a:t>
+            </a:r>
+          </a:p>
+        </p:txBody>
+      </p:sp>
+      <p:sp>
+        <p:nvSpPr>
+          <p:cNvPr id="14" name="TextBox 13">
+            <a:extLst>
+              <a:ext uri="{FF2B5EF4-FFF2-40B4-BE49-F238E27FC236}">
+                <a16:creationId xmlns:a16="http://schemas.microsoft.com/office/drawing/2014/main" id="{579C3B66-695F-3A23-8A48-6C2147DFDA46}"/>
+              </a:ext>
+            </a:extLst>
+          </p:cNvPr>
+          <p:cNvSpPr txBox="1"/>
+          <p:nvPr/>
+        </p:nvSpPr>
+        <p:spPr>
+          <a:xfrm>
+            <a:off x="5068448" y="4980052"/>
+            <a:ext cx="2013565" cy="369332"/>
+          </a:xfrm>
+          <a:prstGeom prst="rect">
+            <a:avLst/>
+          </a:prstGeom>
+          <a:noFill/>
+        </p:spPr>
+        <p:txBody>
+          <a:bodyPr wrap="none" rtlCol="0">
+            <a:spAutoFit/>
+          </a:bodyPr>
+          <a:lstStyle/>
+          <a:p>
+            <a:r>
+              <a:rPr lang="en-AU" dirty="0"/>
+              <a:t>Partial Dependency</a:t>
+            </a:r>
+          </a:p>
+        </p:txBody>
+      </p:sp>
+    </p:spTree>
+    <p:extLst>
+      <p:ext uri="{BB962C8B-B14F-4D97-AF65-F5344CB8AC3E}">
+        <p14:creationId xmlns:p14="http://schemas.microsoft.com/office/powerpoint/2010/main" val="725170940"/>
+      </p:ext>
+    </p:extLst>
+  </p:cSld>
+  <p:clrMapOvr>
+    <a:masterClrMapping/>
+  </p:clrMapOvr>
+</p:sld>
+</file>
+
+<file path=ppt/slides/slide2.xml><?xml version="1.0" encoding="utf-8"?>
+<p:sld xmlns:a="http://schemas.openxmlformats.org/drawingml/2006/main" xmlns:r="http://schemas.openxmlformats.org/officeDocument/2006/relationships" xmlns:p="http://schemas.openxmlformats.org/presentationml/2006/main">
+  <p:cSld>
+    <p:spTree>
+      <p:nvGrpSpPr>
+        <p:cNvPr id="1" name=""/>
+        <p:cNvGrpSpPr/>
+        <p:nvPr/>
+      </p:nvGrpSpPr>
+      <p:grpSpPr>
+        <a:xfrm>
+          <a:off x="0" y="0"/>
+          <a:ext cx="0" cy="0"/>
+          <a:chOff x="0" y="0"/>
+          <a:chExt cx="0" cy="0"/>
+        </a:xfrm>
+      </p:grpSpPr>
+      <p:pic>
+        <p:nvPicPr>
+          <p:cNvPr id="2" name="Picture 1">
+            <a:extLst>
+              <a:ext uri="{FF2B5EF4-FFF2-40B4-BE49-F238E27FC236}">
+                <a16:creationId xmlns:a16="http://schemas.microsoft.com/office/drawing/2014/main" id="{8C44A70B-9E78-7DEB-29B1-D26DDC603C2D}"/>
+              </a:ext>
+            </a:extLst>
+          </p:cNvPr>
+          <p:cNvPicPr>
+            <a:picLocks noChangeAspect="1"/>
+          </p:cNvPicPr>
+          <p:nvPr/>
+        </p:nvPicPr>
+        <p:blipFill>
+          <a:blip r:embed="rId2"/>
+          <a:stretch>
+            <a:fillRect/>
+          </a:stretch>
+        </p:blipFill>
+        <p:spPr>
+          <a:xfrm>
+            <a:off x="98628" y="2160142"/>
+            <a:ext cx="6041606" cy="1159932"/>
+          </a:xfrm>
+          <a:prstGeom prst="rect">
+            <a:avLst/>
+          </a:prstGeom>
+        </p:spPr>
+      </p:pic>
+      <p:pic>
+        <p:nvPicPr>
+          <p:cNvPr id="4" name="Picture 3">
+            <a:extLst>
+              <a:ext uri="{FF2B5EF4-FFF2-40B4-BE49-F238E27FC236}">
+                <a16:creationId xmlns:a16="http://schemas.microsoft.com/office/drawing/2014/main" id="{DAFF02E5-6ABB-BEFF-F069-9684A26A04DD}"/>
+              </a:ext>
+            </a:extLst>
+          </p:cNvPr>
+          <p:cNvPicPr>
+            <a:picLocks noChangeAspect="1"/>
+          </p:cNvPicPr>
+          <p:nvPr/>
+        </p:nvPicPr>
+        <p:blipFill>
+          <a:blip r:embed="rId3"/>
+          <a:stretch>
+            <a:fillRect/>
+          </a:stretch>
+        </p:blipFill>
+        <p:spPr>
+          <a:xfrm>
+            <a:off x="9071761" y="337599"/>
+            <a:ext cx="2715004" cy="1295581"/>
+          </a:xfrm>
+          <a:prstGeom prst="rect">
+            <a:avLst/>
+          </a:prstGeom>
+        </p:spPr>
+      </p:pic>
+      <p:pic>
+        <p:nvPicPr>
+          <p:cNvPr id="6" name="Picture 5">
+            <a:extLst>
+              <a:ext uri="{FF2B5EF4-FFF2-40B4-BE49-F238E27FC236}">
+                <a16:creationId xmlns:a16="http://schemas.microsoft.com/office/drawing/2014/main" id="{25285B3C-FF3E-6F3D-5B74-2C3953E6D2A2}"/>
+              </a:ext>
+            </a:extLst>
+          </p:cNvPr>
+          <p:cNvPicPr>
+            <a:picLocks noChangeAspect="1"/>
+          </p:cNvPicPr>
+          <p:nvPr/>
+        </p:nvPicPr>
+        <p:blipFill>
+          <a:blip r:embed="rId4"/>
+          <a:stretch>
+            <a:fillRect/>
+          </a:stretch>
+        </p:blipFill>
+        <p:spPr>
+          <a:xfrm>
+            <a:off x="9079535" y="1949422"/>
+            <a:ext cx="2743583" cy="1581371"/>
+          </a:xfrm>
+          <a:prstGeom prst="rect">
+            <a:avLst/>
+          </a:prstGeom>
+        </p:spPr>
+      </p:pic>
+      <p:pic>
+        <p:nvPicPr>
+          <p:cNvPr id="8" name="Picture 7">
+            <a:extLst>
+              <a:ext uri="{FF2B5EF4-FFF2-40B4-BE49-F238E27FC236}">
+                <a16:creationId xmlns:a16="http://schemas.microsoft.com/office/drawing/2014/main" id="{BC93808C-1719-DFE0-7581-DA02E24878F2}"/>
+              </a:ext>
+            </a:extLst>
+          </p:cNvPr>
+          <p:cNvPicPr>
+            <a:picLocks noChangeAspect="1"/>
+          </p:cNvPicPr>
+          <p:nvPr/>
+        </p:nvPicPr>
+        <p:blipFill>
+          <a:blip r:embed="rId5"/>
+          <a:stretch>
+            <a:fillRect/>
+          </a:stretch>
+        </p:blipFill>
+        <p:spPr>
+          <a:xfrm>
+            <a:off x="7984007" y="3957660"/>
+            <a:ext cx="3839111" cy="1543265"/>
+          </a:xfrm>
+          <a:prstGeom prst="rect">
+            <a:avLst/>
+          </a:prstGeom>
+        </p:spPr>
+      </p:pic>
+      <p:sp>
+        <p:nvSpPr>
+          <p:cNvPr id="9" name="Arrow: Right 8">
+            <a:extLst>
+              <a:ext uri="{FF2B5EF4-FFF2-40B4-BE49-F238E27FC236}">
+                <a16:creationId xmlns:a16="http://schemas.microsoft.com/office/drawing/2014/main" id="{61AB888E-2C66-3B78-FE0F-D4F2D045FFC9}"/>
+              </a:ext>
+            </a:extLst>
+          </p:cNvPr>
+          <p:cNvSpPr/>
+          <p:nvPr/>
+        </p:nvSpPr>
+        <p:spPr>
+          <a:xfrm>
+            <a:off x="6562850" y="2623017"/>
+            <a:ext cx="1047749" cy="805983"/>
+          </a:xfrm>
+          <a:prstGeom prst="rightArrow">
+            <a:avLst/>
+          </a:prstGeom>
+        </p:spPr>
+        <p:style>
+          <a:lnRef idx="2">
+            <a:schemeClr val="accent1">
+              <a:shade val="50000"/>
+            </a:schemeClr>
+          </a:lnRef>
+          <a:fillRef idx="1">
+            <a:schemeClr val="accent1"/>
+          </a:fillRef>
+          <a:effectRef idx="0">
+            <a:schemeClr val="accent1"/>
+          </a:effectRef>
+          <a:fontRef idx="minor">
+            <a:schemeClr val="lt1"/>
+          </a:fontRef>
+        </p:style>
+        <p:txBody>
+          <a:bodyPr rtlCol="0" anchor="ctr"/>
+          <a:lstStyle/>
+          <a:p>
+            <a:pPr algn="ctr"/>
+            <a:endParaRPr lang="en-AU"/>
+          </a:p>
+        </p:txBody>
+      </p:sp>
+      <p:sp>
+        <p:nvSpPr>
+          <p:cNvPr id="10" name="TextBox 9">
+            <a:extLst>
+              <a:ext uri="{FF2B5EF4-FFF2-40B4-BE49-F238E27FC236}">
+                <a16:creationId xmlns:a16="http://schemas.microsoft.com/office/drawing/2014/main" id="{D26585A6-720A-E7B9-18DC-9D37CFF9A151}"/>
+              </a:ext>
+            </a:extLst>
+          </p:cNvPr>
+          <p:cNvSpPr txBox="1"/>
+          <p:nvPr/>
+        </p:nvSpPr>
+        <p:spPr>
+          <a:xfrm>
+            <a:off x="6433849" y="2418121"/>
+            <a:ext cx="1047750" cy="369332"/>
+          </a:xfrm>
+          <a:prstGeom prst="rect">
+            <a:avLst/>
+          </a:prstGeom>
+          <a:noFill/>
+        </p:spPr>
+        <p:txBody>
+          <a:bodyPr wrap="square" rtlCol="0">
+            <a:spAutoFit/>
+          </a:bodyPr>
+          <a:lstStyle/>
+          <a:p>
+            <a:pPr algn="ctr"/>
+            <a:r>
+              <a:rPr lang="en-AU" b="1" dirty="0"/>
+              <a:t>2NF</a:t>
+            </a:r>
+          </a:p>
+        </p:txBody>
+      </p:sp>
+    </p:spTree>
+    <p:extLst>
+      <p:ext uri="{BB962C8B-B14F-4D97-AF65-F5344CB8AC3E}">
+        <p14:creationId xmlns:p14="http://schemas.microsoft.com/office/powerpoint/2010/main" val="3891457667"/>
+      </p:ext>
+    </p:extLst>
+  </p:cSld>
+  <p:clrMapOvr>
+    <a:masterClrMapping/>
+  </p:clrMapOvr>
+</p:sld>
+</file>
+
+<file path=ppt/slides/slide3.xml><?xml version="1.0" encoding="utf-8"?>
+<p:sld xmlns:a="http://schemas.openxmlformats.org/drawingml/2006/main" xmlns:r="http://schemas.openxmlformats.org/officeDocument/2006/relationships" xmlns:p="http://schemas.openxmlformats.org/presentationml/2006/main">
+  <p:cSld>
+    <p:spTree>
+      <p:nvGrpSpPr>
+        <p:cNvPr id="1" name=""/>
+        <p:cNvGrpSpPr/>
+        <p:nvPr/>
+      </p:nvGrpSpPr>
+      <p:grpSpPr>
+        <a:xfrm>
+          <a:off x="0" y="0"/>
+          <a:ext cx="0" cy="0"/>
+          <a:chOff x="0" y="0"/>
+          <a:chExt cx="0" cy="0"/>
+        </a:xfrm>
+      </p:grpSpPr>
+    </p:spTree>
+    <p:extLst>
+      <p:ext uri="{BB962C8B-B14F-4D97-AF65-F5344CB8AC3E}">
+        <p14:creationId xmlns:p14="http://schemas.microsoft.com/office/powerpoint/2010/main" val="1749882466"/>
+      </p:ext>
+    </p:extLst>
+  </p:cSld>
+  <p:clrMapOvr>
+    <a:masterClrMapping/>
+  </p:clrMapOvr>
+</p:sld>
+</file>
+
+<file path=ppt/slides/slide4.xml><?xml version="1.0" encoding="utf-8"?>
+<p:sld xmlns:a="http://schemas.openxmlformats.org/drawingml/2006/main" xmlns:r="http://schemas.openxmlformats.org/officeDocument/2006/relationships" xmlns:p="http://schemas.openxmlformats.org/presentationml/2006/main">
+  <p:cSld>
+    <p:spTree>
+      <p:nvGrpSpPr>
+        <p:cNvPr id="1" name=""/>
+        <p:cNvGrpSpPr/>
+        <p:nvPr/>
+      </p:nvGrpSpPr>
+      <p:grpSpPr>
+        <a:xfrm>
+          <a:off x="0" y="0"/>
+          <a:ext cx="0" cy="0"/>
+          <a:chOff x="0" y="0"/>
+          <a:chExt cx="0" cy="0"/>
+        </a:xfrm>
+      </p:grpSpPr>
+      <p:pic>
+        <p:nvPicPr>
           <p:cNvPr id="4" name="Picture 3">
             <a:extLst>
               <a:ext uri="{FF2B5EF4-FFF2-40B4-BE49-F238E27FC236}">
@@ -3939,7 +4958,898 @@
 </p:sld>
 </file>
 
-<file path=ppt/slides/slide2.xml><?xml version="1.0" encoding="utf-8"?>
+<file path=ppt/slides/slide5.xml><?xml version="1.0" encoding="utf-8"?>
+<p:sld xmlns:a="http://schemas.openxmlformats.org/drawingml/2006/main" xmlns:r="http://schemas.openxmlformats.org/officeDocument/2006/relationships" xmlns:p="http://schemas.openxmlformats.org/presentationml/2006/main">
+  <p:cSld>
+    <p:spTree>
+      <p:nvGrpSpPr>
+        <p:cNvPr id="1" name=""/>
+        <p:cNvGrpSpPr/>
+        <p:nvPr/>
+      </p:nvGrpSpPr>
+      <p:grpSpPr>
+        <a:xfrm>
+          <a:off x="0" y="0"/>
+          <a:ext cx="0" cy="0"/>
+          <a:chOff x="0" y="0"/>
+          <a:chExt cx="0" cy="0"/>
+        </a:xfrm>
+      </p:grpSpPr>
+      <p:pic>
+        <p:nvPicPr>
+          <p:cNvPr id="4" name="Picture 3">
+            <a:extLst>
+              <a:ext uri="{FF2B5EF4-FFF2-40B4-BE49-F238E27FC236}">
+                <a16:creationId xmlns:a16="http://schemas.microsoft.com/office/drawing/2014/main" id="{35CDA272-4310-05A1-AD91-2CF2E8CE43DA}"/>
+              </a:ext>
+            </a:extLst>
+          </p:cNvPr>
+          <p:cNvPicPr>
+            <a:picLocks noChangeAspect="1"/>
+          </p:cNvPicPr>
+          <p:nvPr/>
+        </p:nvPicPr>
+        <p:blipFill>
+          <a:blip r:embed="rId2"/>
+          <a:stretch>
+            <a:fillRect/>
+          </a:stretch>
+        </p:blipFill>
+        <p:spPr>
+          <a:xfrm>
+            <a:off x="494518" y="2161998"/>
+            <a:ext cx="11202963" cy="2534004"/>
+          </a:xfrm>
+          <a:prstGeom prst="rect">
+            <a:avLst/>
+          </a:prstGeom>
+        </p:spPr>
+      </p:pic>
+      <p:sp>
+        <p:nvSpPr>
+          <p:cNvPr id="17" name="Free-form: Shape 16">
+            <a:extLst>
+              <a:ext uri="{FF2B5EF4-FFF2-40B4-BE49-F238E27FC236}">
+                <a16:creationId xmlns:a16="http://schemas.microsoft.com/office/drawing/2014/main" id="{D3C56F84-A339-4ED2-3CE0-1EE2A13AC646}"/>
+              </a:ext>
+            </a:extLst>
+          </p:cNvPr>
+          <p:cNvSpPr/>
+          <p:nvPr/>
+        </p:nvSpPr>
+        <p:spPr>
+          <a:xfrm>
+            <a:off x="1257300" y="1190450"/>
+            <a:ext cx="9677400" cy="651052"/>
+          </a:xfrm>
+          <a:custGeom>
+            <a:avLst/>
+            <a:gdLst>
+              <a:gd name="connsiteX0" fmla="*/ 0 w 8795658"/>
+              <a:gd name="connsiteY0" fmla="*/ 0 h 654681"/>
+              <a:gd name="connsiteX1" fmla="*/ 195943 w 8795658"/>
+              <a:gd name="connsiteY1" fmla="*/ 0 h 654681"/>
+              <a:gd name="connsiteX2" fmla="*/ 195943 w 8795658"/>
+              <a:gd name="connsiteY2" fmla="*/ 1538 h 654681"/>
+              <a:gd name="connsiteX3" fmla="*/ 2823029 w 8795658"/>
+              <a:gd name="connsiteY3" fmla="*/ 1538 h 654681"/>
+              <a:gd name="connsiteX4" fmla="*/ 2823029 w 8795658"/>
+              <a:gd name="connsiteY4" fmla="*/ 1537 h 654681"/>
+              <a:gd name="connsiteX5" fmla="*/ 5646058 w 8795658"/>
+              <a:gd name="connsiteY5" fmla="*/ 1537 h 654681"/>
+              <a:gd name="connsiteX6" fmla="*/ 5898243 w 8795658"/>
+              <a:gd name="connsiteY6" fmla="*/ 1537 h 654681"/>
+              <a:gd name="connsiteX7" fmla="*/ 8721272 w 8795658"/>
+              <a:gd name="connsiteY7" fmla="*/ 1537 h 654681"/>
+              <a:gd name="connsiteX8" fmla="*/ 8721272 w 8795658"/>
+              <a:gd name="connsiteY8" fmla="*/ 491394 h 654681"/>
+              <a:gd name="connsiteX9" fmla="*/ 8795658 w 8795658"/>
+              <a:gd name="connsiteY9" fmla="*/ 491394 h 654681"/>
+              <a:gd name="connsiteX10" fmla="*/ 8632372 w 8795658"/>
+              <a:gd name="connsiteY10" fmla="*/ 654680 h 654681"/>
+              <a:gd name="connsiteX11" fmla="*/ 8469087 w 8795658"/>
+              <a:gd name="connsiteY11" fmla="*/ 491394 h 654681"/>
+              <a:gd name="connsiteX12" fmla="*/ 8543473 w 8795658"/>
+              <a:gd name="connsiteY12" fmla="*/ 491394 h 654681"/>
+              <a:gd name="connsiteX13" fmla="*/ 8543473 w 8795658"/>
+              <a:gd name="connsiteY13" fmla="*/ 179336 h 654681"/>
+              <a:gd name="connsiteX14" fmla="*/ 5898243 w 8795658"/>
+              <a:gd name="connsiteY14" fmla="*/ 179336 h 654681"/>
+              <a:gd name="connsiteX15" fmla="*/ 5898243 w 8795658"/>
+              <a:gd name="connsiteY15" fmla="*/ 491394 h 654681"/>
+              <a:gd name="connsiteX16" fmla="*/ 5972629 w 8795658"/>
+              <a:gd name="connsiteY16" fmla="*/ 491394 h 654681"/>
+              <a:gd name="connsiteX17" fmla="*/ 5809343 w 8795658"/>
+              <a:gd name="connsiteY17" fmla="*/ 654680 h 654681"/>
+              <a:gd name="connsiteX18" fmla="*/ 5646058 w 8795658"/>
+              <a:gd name="connsiteY18" fmla="*/ 491394 h 654681"/>
+              <a:gd name="connsiteX19" fmla="*/ 5720444 w 8795658"/>
+              <a:gd name="connsiteY19" fmla="*/ 491394 h 654681"/>
+              <a:gd name="connsiteX20" fmla="*/ 5720444 w 8795658"/>
+              <a:gd name="connsiteY20" fmla="*/ 179336 h 654681"/>
+              <a:gd name="connsiteX21" fmla="*/ 5646058 w 8795658"/>
+              <a:gd name="connsiteY21" fmla="*/ 179336 h 654681"/>
+              <a:gd name="connsiteX22" fmla="*/ 3075214 w 8795658"/>
+              <a:gd name="connsiteY22" fmla="*/ 179336 h 654681"/>
+              <a:gd name="connsiteX23" fmla="*/ 3075214 w 8795658"/>
+              <a:gd name="connsiteY23" fmla="*/ 491395 h 654681"/>
+              <a:gd name="connsiteX24" fmla="*/ 3149600 w 8795658"/>
+              <a:gd name="connsiteY24" fmla="*/ 491395 h 654681"/>
+              <a:gd name="connsiteX25" fmla="*/ 2986314 w 8795658"/>
+              <a:gd name="connsiteY25" fmla="*/ 654681 h 654681"/>
+              <a:gd name="connsiteX26" fmla="*/ 2823029 w 8795658"/>
+              <a:gd name="connsiteY26" fmla="*/ 491395 h 654681"/>
+              <a:gd name="connsiteX27" fmla="*/ 2897415 w 8795658"/>
+              <a:gd name="connsiteY27" fmla="*/ 491395 h 654681"/>
+              <a:gd name="connsiteX28" fmla="*/ 2897415 w 8795658"/>
+              <a:gd name="connsiteY28" fmla="*/ 179337 h 654681"/>
+              <a:gd name="connsiteX29" fmla="*/ 195943 w 8795658"/>
+              <a:gd name="connsiteY29" fmla="*/ 179337 h 654681"/>
+              <a:gd name="connsiteX30" fmla="*/ 195943 w 8795658"/>
+              <a:gd name="connsiteY30" fmla="*/ 653143 h 654681"/>
+              <a:gd name="connsiteX31" fmla="*/ 0 w 8795658"/>
+              <a:gd name="connsiteY31" fmla="*/ 653143 h 654681"/>
+              <a:gd name="connsiteX32" fmla="*/ 0 w 8795658"/>
+              <a:gd name="connsiteY32" fmla="*/ 179337 h 654681"/>
+              <a:gd name="connsiteX33" fmla="*/ 0 w 8795658"/>
+              <a:gd name="connsiteY33" fmla="*/ 1538 h 654681"/>
+            </a:gdLst>
+            <a:ahLst/>
+            <a:cxnLst>
+              <a:cxn ang="0">
+                <a:pos x="connsiteX0" y="connsiteY0"/>
+              </a:cxn>
+              <a:cxn ang="0">
+                <a:pos x="connsiteX1" y="connsiteY1"/>
+              </a:cxn>
+              <a:cxn ang="0">
+                <a:pos x="connsiteX2" y="connsiteY2"/>
+              </a:cxn>
+              <a:cxn ang="0">
+                <a:pos x="connsiteX3" y="connsiteY3"/>
+              </a:cxn>
+              <a:cxn ang="0">
+                <a:pos x="connsiteX4" y="connsiteY4"/>
+              </a:cxn>
+              <a:cxn ang="0">
+                <a:pos x="connsiteX5" y="connsiteY5"/>
+              </a:cxn>
+              <a:cxn ang="0">
+                <a:pos x="connsiteX6" y="connsiteY6"/>
+              </a:cxn>
+              <a:cxn ang="0">
+                <a:pos x="connsiteX7" y="connsiteY7"/>
+              </a:cxn>
+              <a:cxn ang="0">
+                <a:pos x="connsiteX8" y="connsiteY8"/>
+              </a:cxn>
+              <a:cxn ang="0">
+                <a:pos x="connsiteX9" y="connsiteY9"/>
+              </a:cxn>
+              <a:cxn ang="0">
+                <a:pos x="connsiteX10" y="connsiteY10"/>
+              </a:cxn>
+              <a:cxn ang="0">
+                <a:pos x="connsiteX11" y="connsiteY11"/>
+              </a:cxn>
+              <a:cxn ang="0">
+                <a:pos x="connsiteX12" y="connsiteY12"/>
+              </a:cxn>
+              <a:cxn ang="0">
+                <a:pos x="connsiteX13" y="connsiteY13"/>
+              </a:cxn>
+              <a:cxn ang="0">
+                <a:pos x="connsiteX14" y="connsiteY14"/>
+              </a:cxn>
+              <a:cxn ang="0">
+                <a:pos x="connsiteX15" y="connsiteY15"/>
+              </a:cxn>
+              <a:cxn ang="0">
+                <a:pos x="connsiteX16" y="connsiteY16"/>
+              </a:cxn>
+              <a:cxn ang="0">
+                <a:pos x="connsiteX17" y="connsiteY17"/>
+              </a:cxn>
+              <a:cxn ang="0">
+                <a:pos x="connsiteX18" y="connsiteY18"/>
+              </a:cxn>
+              <a:cxn ang="0">
+                <a:pos x="connsiteX19" y="connsiteY19"/>
+              </a:cxn>
+              <a:cxn ang="0">
+                <a:pos x="connsiteX20" y="connsiteY20"/>
+              </a:cxn>
+              <a:cxn ang="0">
+                <a:pos x="connsiteX21" y="connsiteY21"/>
+              </a:cxn>
+              <a:cxn ang="0">
+                <a:pos x="connsiteX22" y="connsiteY22"/>
+              </a:cxn>
+              <a:cxn ang="0">
+                <a:pos x="connsiteX23" y="connsiteY23"/>
+              </a:cxn>
+              <a:cxn ang="0">
+                <a:pos x="connsiteX24" y="connsiteY24"/>
+              </a:cxn>
+              <a:cxn ang="0">
+                <a:pos x="connsiteX25" y="connsiteY25"/>
+              </a:cxn>
+              <a:cxn ang="0">
+                <a:pos x="connsiteX26" y="connsiteY26"/>
+              </a:cxn>
+              <a:cxn ang="0">
+                <a:pos x="connsiteX27" y="connsiteY27"/>
+              </a:cxn>
+              <a:cxn ang="0">
+                <a:pos x="connsiteX28" y="connsiteY28"/>
+              </a:cxn>
+              <a:cxn ang="0">
+                <a:pos x="connsiteX29" y="connsiteY29"/>
+              </a:cxn>
+              <a:cxn ang="0">
+                <a:pos x="connsiteX30" y="connsiteY30"/>
+              </a:cxn>
+              <a:cxn ang="0">
+                <a:pos x="connsiteX31" y="connsiteY31"/>
+              </a:cxn>
+              <a:cxn ang="0">
+                <a:pos x="connsiteX32" y="connsiteY32"/>
+              </a:cxn>
+              <a:cxn ang="0">
+                <a:pos x="connsiteX33" y="connsiteY33"/>
+              </a:cxn>
+            </a:cxnLst>
+            <a:rect l="l" t="t" r="r" b="b"/>
+            <a:pathLst>
+              <a:path w="8795658" h="654681">
+                <a:moveTo>
+                  <a:pt x="0" y="0"/>
+                </a:moveTo>
+                <a:lnTo>
+                  <a:pt x="195943" y="0"/>
+                </a:lnTo>
+                <a:lnTo>
+                  <a:pt x="195943" y="1538"/>
+                </a:lnTo>
+                <a:lnTo>
+                  <a:pt x="2823029" y="1538"/>
+                </a:lnTo>
+                <a:lnTo>
+                  <a:pt x="2823029" y="1537"/>
+                </a:lnTo>
+                <a:lnTo>
+                  <a:pt x="5646058" y="1537"/>
+                </a:lnTo>
+                <a:lnTo>
+                  <a:pt x="5898243" y="1537"/>
+                </a:lnTo>
+                <a:lnTo>
+                  <a:pt x="8721272" y="1537"/>
+                </a:lnTo>
+                <a:lnTo>
+                  <a:pt x="8721272" y="491394"/>
+                </a:lnTo>
+                <a:lnTo>
+                  <a:pt x="8795658" y="491394"/>
+                </a:lnTo>
+                <a:lnTo>
+                  <a:pt x="8632372" y="654680"/>
+                </a:lnTo>
+                <a:lnTo>
+                  <a:pt x="8469087" y="491394"/>
+                </a:lnTo>
+                <a:lnTo>
+                  <a:pt x="8543473" y="491394"/>
+                </a:lnTo>
+                <a:lnTo>
+                  <a:pt x="8543473" y="179336"/>
+                </a:lnTo>
+                <a:lnTo>
+                  <a:pt x="5898243" y="179336"/>
+                </a:lnTo>
+                <a:lnTo>
+                  <a:pt x="5898243" y="491394"/>
+                </a:lnTo>
+                <a:lnTo>
+                  <a:pt x="5972629" y="491394"/>
+                </a:lnTo>
+                <a:lnTo>
+                  <a:pt x="5809343" y="654680"/>
+                </a:lnTo>
+                <a:lnTo>
+                  <a:pt x="5646058" y="491394"/>
+                </a:lnTo>
+                <a:lnTo>
+                  <a:pt x="5720444" y="491394"/>
+                </a:lnTo>
+                <a:lnTo>
+                  <a:pt x="5720444" y="179336"/>
+                </a:lnTo>
+                <a:lnTo>
+                  <a:pt x="5646058" y="179336"/>
+                </a:lnTo>
+                <a:lnTo>
+                  <a:pt x="3075214" y="179336"/>
+                </a:lnTo>
+                <a:lnTo>
+                  <a:pt x="3075214" y="491395"/>
+                </a:lnTo>
+                <a:lnTo>
+                  <a:pt x="3149600" y="491395"/>
+                </a:lnTo>
+                <a:lnTo>
+                  <a:pt x="2986314" y="654681"/>
+                </a:lnTo>
+                <a:lnTo>
+                  <a:pt x="2823029" y="491395"/>
+                </a:lnTo>
+                <a:lnTo>
+                  <a:pt x="2897415" y="491395"/>
+                </a:lnTo>
+                <a:lnTo>
+                  <a:pt x="2897415" y="179337"/>
+                </a:lnTo>
+                <a:lnTo>
+                  <a:pt x="195943" y="179337"/>
+                </a:lnTo>
+                <a:lnTo>
+                  <a:pt x="195943" y="653143"/>
+                </a:lnTo>
+                <a:lnTo>
+                  <a:pt x="0" y="653143"/>
+                </a:lnTo>
+                <a:lnTo>
+                  <a:pt x="0" y="179337"/>
+                </a:lnTo>
+                <a:lnTo>
+                  <a:pt x="0" y="1538"/>
+                </a:lnTo>
+                <a:close/>
+              </a:path>
+            </a:pathLst>
+          </a:custGeom>
+        </p:spPr>
+        <p:style>
+          <a:lnRef idx="2">
+            <a:schemeClr val="accent1">
+              <a:shade val="15000"/>
+            </a:schemeClr>
+          </a:lnRef>
+          <a:fillRef idx="1">
+            <a:schemeClr val="accent1"/>
+          </a:fillRef>
+          <a:effectRef idx="0">
+            <a:schemeClr val="accent1"/>
+          </a:effectRef>
+          <a:fontRef idx="minor">
+            <a:schemeClr val="lt1"/>
+          </a:fontRef>
+        </p:style>
+        <p:txBody>
+          <a:bodyPr wrap="square" rtlCol="0" anchor="ctr">
+            <a:noAutofit/>
+          </a:bodyPr>
+          <a:lstStyle/>
+          <a:p>
+            <a:pPr algn="ctr"/>
+            <a:endParaRPr lang="en-GB"/>
+          </a:p>
+        </p:txBody>
+      </p:sp>
+      <p:sp>
+        <p:nvSpPr>
+          <p:cNvPr id="20" name="Free-form: Shape 19">
+            <a:extLst>
+              <a:ext uri="{FF2B5EF4-FFF2-40B4-BE49-F238E27FC236}">
+                <a16:creationId xmlns:a16="http://schemas.microsoft.com/office/drawing/2014/main" id="{9F8A6D67-ACD9-70AF-37D3-3D4502BF9420}"/>
+              </a:ext>
+            </a:extLst>
+          </p:cNvPr>
+          <p:cNvSpPr/>
+          <p:nvPr/>
+        </p:nvSpPr>
+        <p:spPr>
+          <a:xfrm>
+            <a:off x="6794068" y="4895098"/>
+            <a:ext cx="3657600" cy="752651"/>
+          </a:xfrm>
+          <a:custGeom>
+            <a:avLst/>
+            <a:gdLst>
+              <a:gd name="connsiteX0" fmla="*/ 3024937 w 3213100"/>
+              <a:gd name="connsiteY0" fmla="*/ 0 h 752651"/>
+              <a:gd name="connsiteX1" fmla="*/ 3213100 w 3213100"/>
+              <a:gd name="connsiteY1" fmla="*/ 188163 h 752651"/>
+              <a:gd name="connsiteX2" fmla="*/ 3119019 w 3213100"/>
+              <a:gd name="connsiteY2" fmla="*/ 188163 h 752651"/>
+              <a:gd name="connsiteX3" fmla="*/ 3119019 w 3213100"/>
+              <a:gd name="connsiteY3" fmla="*/ 752651 h 752651"/>
+              <a:gd name="connsiteX4" fmla="*/ 228600 w 3213100"/>
+              <a:gd name="connsiteY4" fmla="*/ 752651 h 752651"/>
+              <a:gd name="connsiteX5" fmla="*/ 0 w 3213100"/>
+              <a:gd name="connsiteY5" fmla="*/ 752651 h 752651"/>
+              <a:gd name="connsiteX6" fmla="*/ 0 w 3213100"/>
+              <a:gd name="connsiteY6" fmla="*/ 564488 h 752651"/>
+              <a:gd name="connsiteX7" fmla="*/ 0 w 3213100"/>
+              <a:gd name="connsiteY7" fmla="*/ 79551 h 752651"/>
+              <a:gd name="connsiteX8" fmla="*/ 228600 w 3213100"/>
+              <a:gd name="connsiteY8" fmla="*/ 79551 h 752651"/>
+              <a:gd name="connsiteX9" fmla="*/ 228600 w 3213100"/>
+              <a:gd name="connsiteY9" fmla="*/ 564488 h 752651"/>
+              <a:gd name="connsiteX10" fmla="*/ 2930856 w 3213100"/>
+              <a:gd name="connsiteY10" fmla="*/ 564488 h 752651"/>
+              <a:gd name="connsiteX11" fmla="*/ 2930856 w 3213100"/>
+              <a:gd name="connsiteY11" fmla="*/ 188163 h 752651"/>
+              <a:gd name="connsiteX12" fmla="*/ 2836775 w 3213100"/>
+              <a:gd name="connsiteY12" fmla="*/ 188163 h 752651"/>
+            </a:gdLst>
+            <a:ahLst/>
+            <a:cxnLst>
+              <a:cxn ang="0">
+                <a:pos x="connsiteX0" y="connsiteY0"/>
+              </a:cxn>
+              <a:cxn ang="0">
+                <a:pos x="connsiteX1" y="connsiteY1"/>
+              </a:cxn>
+              <a:cxn ang="0">
+                <a:pos x="connsiteX2" y="connsiteY2"/>
+              </a:cxn>
+              <a:cxn ang="0">
+                <a:pos x="connsiteX3" y="connsiteY3"/>
+              </a:cxn>
+              <a:cxn ang="0">
+                <a:pos x="connsiteX4" y="connsiteY4"/>
+              </a:cxn>
+              <a:cxn ang="0">
+                <a:pos x="connsiteX5" y="connsiteY5"/>
+              </a:cxn>
+              <a:cxn ang="0">
+                <a:pos x="connsiteX6" y="connsiteY6"/>
+              </a:cxn>
+              <a:cxn ang="0">
+                <a:pos x="connsiteX7" y="connsiteY7"/>
+              </a:cxn>
+              <a:cxn ang="0">
+                <a:pos x="connsiteX8" y="connsiteY8"/>
+              </a:cxn>
+              <a:cxn ang="0">
+                <a:pos x="connsiteX9" y="connsiteY9"/>
+              </a:cxn>
+              <a:cxn ang="0">
+                <a:pos x="connsiteX10" y="connsiteY10"/>
+              </a:cxn>
+              <a:cxn ang="0">
+                <a:pos x="connsiteX11" y="connsiteY11"/>
+              </a:cxn>
+              <a:cxn ang="0">
+                <a:pos x="connsiteX12" y="connsiteY12"/>
+              </a:cxn>
+            </a:cxnLst>
+            <a:rect l="l" t="t" r="r" b="b"/>
+            <a:pathLst>
+              <a:path w="3213100" h="752651">
+                <a:moveTo>
+                  <a:pt x="3024937" y="0"/>
+                </a:moveTo>
+                <a:lnTo>
+                  <a:pt x="3213100" y="188163"/>
+                </a:lnTo>
+                <a:lnTo>
+                  <a:pt x="3119019" y="188163"/>
+                </a:lnTo>
+                <a:lnTo>
+                  <a:pt x="3119019" y="752651"/>
+                </a:lnTo>
+                <a:lnTo>
+                  <a:pt x="228600" y="752651"/>
+                </a:lnTo>
+                <a:lnTo>
+                  <a:pt x="0" y="752651"/>
+                </a:lnTo>
+                <a:lnTo>
+                  <a:pt x="0" y="564488"/>
+                </a:lnTo>
+                <a:lnTo>
+                  <a:pt x="0" y="79551"/>
+                </a:lnTo>
+                <a:lnTo>
+                  <a:pt x="228600" y="79551"/>
+                </a:lnTo>
+                <a:lnTo>
+                  <a:pt x="228600" y="564488"/>
+                </a:lnTo>
+                <a:lnTo>
+                  <a:pt x="2930856" y="564488"/>
+                </a:lnTo>
+                <a:lnTo>
+                  <a:pt x="2930856" y="188163"/>
+                </a:lnTo>
+                <a:lnTo>
+                  <a:pt x="2836775" y="188163"/>
+                </a:lnTo>
+                <a:close/>
+              </a:path>
+            </a:pathLst>
+          </a:custGeom>
+          <a:solidFill>
+            <a:schemeClr val="accent2">
+              <a:lumMod val="75000"/>
+            </a:schemeClr>
+          </a:solidFill>
+        </p:spPr>
+        <p:style>
+          <a:lnRef idx="2">
+            <a:schemeClr val="accent1">
+              <a:shade val="15000"/>
+            </a:schemeClr>
+          </a:lnRef>
+          <a:fillRef idx="1">
+            <a:schemeClr val="accent1"/>
+          </a:fillRef>
+          <a:effectRef idx="0">
+            <a:schemeClr val="accent1"/>
+          </a:effectRef>
+          <a:fontRef idx="minor">
+            <a:schemeClr val="lt1"/>
+          </a:fontRef>
+        </p:style>
+        <p:txBody>
+          <a:bodyPr wrap="square" rtlCol="0" anchor="ctr">
+            <a:noAutofit/>
+          </a:bodyPr>
+          <a:lstStyle/>
+          <a:p>
+            <a:pPr algn="ctr"/>
+            <a:endParaRPr lang="en-GB"/>
+          </a:p>
+        </p:txBody>
+      </p:sp>
+      <p:sp>
+        <p:nvSpPr>
+          <p:cNvPr id="21" name="TextBox 20">
+            <a:extLst>
+              <a:ext uri="{FF2B5EF4-FFF2-40B4-BE49-F238E27FC236}">
+                <a16:creationId xmlns:a16="http://schemas.microsoft.com/office/drawing/2014/main" id="{7B39BE8F-AE69-7B91-ECF9-FFBCCC149E18}"/>
+              </a:ext>
+            </a:extLst>
+          </p:cNvPr>
+          <p:cNvSpPr txBox="1"/>
+          <p:nvPr/>
+        </p:nvSpPr>
+        <p:spPr>
+          <a:xfrm>
+            <a:off x="4548427" y="557782"/>
+            <a:ext cx="3095143" cy="523220"/>
+          </a:xfrm>
+          <a:prstGeom prst="rect">
+            <a:avLst/>
+          </a:prstGeom>
+          <a:noFill/>
+        </p:spPr>
+        <p:txBody>
+          <a:bodyPr wrap="none" rtlCol="0">
+            <a:spAutoFit/>
+          </a:bodyPr>
+          <a:lstStyle/>
+          <a:p>
+            <a:r>
+              <a:rPr lang="en-GB" sz="2800" b="1" dirty="0"/>
+              <a:t>Partial Dependency</a:t>
+            </a:r>
+          </a:p>
+        </p:txBody>
+      </p:sp>
+      <p:sp>
+        <p:nvSpPr>
+          <p:cNvPr id="22" name="TextBox 21">
+            <a:extLst>
+              <a:ext uri="{FF2B5EF4-FFF2-40B4-BE49-F238E27FC236}">
+                <a16:creationId xmlns:a16="http://schemas.microsoft.com/office/drawing/2014/main" id="{7C1BCC7E-6104-7B52-ABB8-DFD3BE6541BB}"/>
+              </a:ext>
+            </a:extLst>
+          </p:cNvPr>
+          <p:cNvSpPr txBox="1"/>
+          <p:nvPr/>
+        </p:nvSpPr>
+        <p:spPr>
+          <a:xfrm>
+            <a:off x="6838950" y="5776998"/>
+            <a:ext cx="3567836" cy="523220"/>
+          </a:xfrm>
+          <a:prstGeom prst="rect">
+            <a:avLst/>
+          </a:prstGeom>
+          <a:noFill/>
+        </p:spPr>
+        <p:txBody>
+          <a:bodyPr wrap="none" rtlCol="0">
+            <a:spAutoFit/>
+          </a:bodyPr>
+          <a:lstStyle/>
+          <a:p>
+            <a:r>
+              <a:rPr lang="en-GB" sz="2800" b="1" dirty="0"/>
+              <a:t>Transitive Dependency</a:t>
+            </a:r>
+          </a:p>
+        </p:txBody>
+      </p:sp>
+    </p:spTree>
+    <p:extLst>
+      <p:ext uri="{BB962C8B-B14F-4D97-AF65-F5344CB8AC3E}">
+        <p14:creationId xmlns:p14="http://schemas.microsoft.com/office/powerpoint/2010/main" val="188860593"/>
+      </p:ext>
+    </p:extLst>
+  </p:cSld>
+  <p:clrMapOvr>
+    <a:masterClrMapping/>
+  </p:clrMapOvr>
+</p:sld>
+</file>
+
+<file path=ppt/slides/slide6.xml><?xml version="1.0" encoding="utf-8"?>
+<p:sld xmlns:a="http://schemas.openxmlformats.org/drawingml/2006/main" xmlns:r="http://schemas.openxmlformats.org/officeDocument/2006/relationships" xmlns:p="http://schemas.openxmlformats.org/presentationml/2006/main">
+  <p:cSld>
+    <p:spTree>
+      <p:nvGrpSpPr>
+        <p:cNvPr id="1" name=""/>
+        <p:cNvGrpSpPr/>
+        <p:nvPr/>
+      </p:nvGrpSpPr>
+      <p:grpSpPr>
+        <a:xfrm>
+          <a:off x="0" y="0"/>
+          <a:ext cx="0" cy="0"/>
+          <a:chOff x="0" y="0"/>
+          <a:chExt cx="0" cy="0"/>
+        </a:xfrm>
+      </p:grpSpPr>
+      <p:pic>
+        <p:nvPicPr>
+          <p:cNvPr id="3" name="Picture 2">
+            <a:extLst>
+              <a:ext uri="{FF2B5EF4-FFF2-40B4-BE49-F238E27FC236}">
+                <a16:creationId xmlns:a16="http://schemas.microsoft.com/office/drawing/2014/main" id="{311D7EBC-E637-03CA-BDBB-66D6429C46C7}"/>
+              </a:ext>
+            </a:extLst>
+          </p:cNvPr>
+          <p:cNvPicPr>
+            <a:picLocks noChangeAspect="1"/>
+          </p:cNvPicPr>
+          <p:nvPr/>
+        </p:nvPicPr>
+        <p:blipFill>
+          <a:blip r:embed="rId2"/>
+          <a:stretch>
+            <a:fillRect/>
+          </a:stretch>
+        </p:blipFill>
+        <p:spPr>
+          <a:xfrm>
+            <a:off x="7872934" y="265602"/>
+            <a:ext cx="4144895" cy="1272240"/>
+          </a:xfrm>
+          <a:prstGeom prst="rect">
+            <a:avLst/>
+          </a:prstGeom>
+        </p:spPr>
+      </p:pic>
+      <p:pic>
+        <p:nvPicPr>
+          <p:cNvPr id="7" name="Picture 6">
+            <a:extLst>
+              <a:ext uri="{FF2B5EF4-FFF2-40B4-BE49-F238E27FC236}">
+                <a16:creationId xmlns:a16="http://schemas.microsoft.com/office/drawing/2014/main" id="{C9C31428-A11E-93ED-E8D9-15084925821D}"/>
+              </a:ext>
+            </a:extLst>
+          </p:cNvPr>
+          <p:cNvPicPr>
+            <a:picLocks noChangeAspect="1"/>
+          </p:cNvPicPr>
+          <p:nvPr/>
+        </p:nvPicPr>
+        <p:blipFill>
+          <a:blip r:embed="rId3"/>
+          <a:stretch>
+            <a:fillRect/>
+          </a:stretch>
+        </p:blipFill>
+        <p:spPr>
+          <a:xfrm>
+            <a:off x="7872934" y="1806562"/>
+            <a:ext cx="3204881" cy="1037771"/>
+          </a:xfrm>
+          <a:prstGeom prst="rect">
+            <a:avLst/>
+          </a:prstGeom>
+        </p:spPr>
+      </p:pic>
+      <p:pic>
+        <p:nvPicPr>
+          <p:cNvPr id="8" name="Picture 7">
+            <a:extLst>
+              <a:ext uri="{FF2B5EF4-FFF2-40B4-BE49-F238E27FC236}">
+                <a16:creationId xmlns:a16="http://schemas.microsoft.com/office/drawing/2014/main" id="{3F75CFD8-AE3F-E7BE-F65C-DD92BA5CBD62}"/>
+              </a:ext>
+            </a:extLst>
+          </p:cNvPr>
+          <p:cNvPicPr>
+            <a:picLocks noChangeAspect="1"/>
+          </p:cNvPicPr>
+          <p:nvPr/>
+        </p:nvPicPr>
+        <p:blipFill>
+          <a:blip r:embed="rId4"/>
+          <a:stretch>
+            <a:fillRect/>
+          </a:stretch>
+        </p:blipFill>
+        <p:spPr>
+          <a:xfrm>
+            <a:off x="6931746" y="3359651"/>
+            <a:ext cx="5087256" cy="1089577"/>
+          </a:xfrm>
+          <a:prstGeom prst="rect">
+            <a:avLst/>
+          </a:prstGeom>
+        </p:spPr>
+      </p:pic>
+      <p:pic>
+        <p:nvPicPr>
+          <p:cNvPr id="9" name="Picture 8">
+            <a:extLst>
+              <a:ext uri="{FF2B5EF4-FFF2-40B4-BE49-F238E27FC236}">
+                <a16:creationId xmlns:a16="http://schemas.microsoft.com/office/drawing/2014/main" id="{D784594D-554C-3518-3875-AF665BDCB1FE}"/>
+              </a:ext>
+            </a:extLst>
+          </p:cNvPr>
+          <p:cNvPicPr>
+            <a:picLocks noChangeAspect="1"/>
+          </p:cNvPicPr>
+          <p:nvPr/>
+        </p:nvPicPr>
+        <p:blipFill>
+          <a:blip r:embed="rId4"/>
+          <a:stretch>
+            <a:fillRect/>
+          </a:stretch>
+        </p:blipFill>
+        <p:spPr>
+          <a:xfrm>
+            <a:off x="375920" y="3429000"/>
+            <a:ext cx="4885509" cy="1089577"/>
+          </a:xfrm>
+          <a:prstGeom prst="rect">
+            <a:avLst/>
+          </a:prstGeom>
+        </p:spPr>
+      </p:pic>
+      <p:pic>
+        <p:nvPicPr>
+          <p:cNvPr id="10" name="Picture 9">
+            <a:extLst>
+              <a:ext uri="{FF2B5EF4-FFF2-40B4-BE49-F238E27FC236}">
+                <a16:creationId xmlns:a16="http://schemas.microsoft.com/office/drawing/2014/main" id="{D78D2367-BA69-A695-17DA-8F5163C7A280}"/>
+              </a:ext>
+            </a:extLst>
+          </p:cNvPr>
+          <p:cNvPicPr>
+            <a:picLocks noChangeAspect="1"/>
+          </p:cNvPicPr>
+          <p:nvPr/>
+        </p:nvPicPr>
+        <p:blipFill>
+          <a:blip r:embed="rId5"/>
+          <a:stretch>
+            <a:fillRect/>
+          </a:stretch>
+        </p:blipFill>
+        <p:spPr>
+          <a:xfrm>
+            <a:off x="375920" y="1267447"/>
+            <a:ext cx="4885509" cy="1078230"/>
+          </a:xfrm>
+          <a:prstGeom prst="rect">
+            <a:avLst/>
+          </a:prstGeom>
+        </p:spPr>
+      </p:pic>
+      <p:sp>
+        <p:nvSpPr>
+          <p:cNvPr id="11" name="Arrow: Right 10">
+            <a:extLst>
+              <a:ext uri="{FF2B5EF4-FFF2-40B4-BE49-F238E27FC236}">
+                <a16:creationId xmlns:a16="http://schemas.microsoft.com/office/drawing/2014/main" id="{18C147F5-448F-5F28-BC7F-B7698F9FE085}"/>
+              </a:ext>
+            </a:extLst>
+          </p:cNvPr>
+          <p:cNvSpPr/>
+          <p:nvPr/>
+        </p:nvSpPr>
+        <p:spPr>
+          <a:xfrm>
+            <a:off x="5519431" y="2345677"/>
+            <a:ext cx="1047749" cy="805983"/>
+          </a:xfrm>
+          <a:prstGeom prst="rightArrow">
+            <a:avLst/>
+          </a:prstGeom>
+        </p:spPr>
+        <p:style>
+          <a:lnRef idx="2">
+            <a:schemeClr val="accent1">
+              <a:shade val="50000"/>
+            </a:schemeClr>
+          </a:lnRef>
+          <a:fillRef idx="1">
+            <a:schemeClr val="accent1"/>
+          </a:fillRef>
+          <a:effectRef idx="0">
+            <a:schemeClr val="accent1"/>
+          </a:effectRef>
+          <a:fontRef idx="minor">
+            <a:schemeClr val="lt1"/>
+          </a:fontRef>
+        </p:style>
+        <p:txBody>
+          <a:bodyPr rtlCol="0" anchor="ctr"/>
+          <a:lstStyle/>
+          <a:p>
+            <a:pPr algn="ctr"/>
+            <a:endParaRPr lang="en-AU"/>
+          </a:p>
+        </p:txBody>
+      </p:sp>
+      <p:sp>
+        <p:nvSpPr>
+          <p:cNvPr id="12" name="TextBox 11">
+            <a:extLst>
+              <a:ext uri="{FF2B5EF4-FFF2-40B4-BE49-F238E27FC236}">
+                <a16:creationId xmlns:a16="http://schemas.microsoft.com/office/drawing/2014/main" id="{E8FCA062-986F-2801-5BDD-1F2420C664CA}"/>
+              </a:ext>
+            </a:extLst>
+          </p:cNvPr>
+          <p:cNvSpPr txBox="1"/>
+          <p:nvPr/>
+        </p:nvSpPr>
+        <p:spPr>
+          <a:xfrm>
+            <a:off x="5390430" y="2140781"/>
+            <a:ext cx="1047750" cy="369332"/>
+          </a:xfrm>
+          <a:prstGeom prst="rect">
+            <a:avLst/>
+          </a:prstGeom>
+          <a:noFill/>
+        </p:spPr>
+        <p:txBody>
+          <a:bodyPr wrap="square" rtlCol="0">
+            <a:spAutoFit/>
+          </a:bodyPr>
+          <a:lstStyle/>
+          <a:p>
+            <a:pPr algn="ctr"/>
+            <a:r>
+              <a:rPr lang="en-AU" b="1" dirty="0"/>
+              <a:t>3NF</a:t>
+            </a:r>
+          </a:p>
+        </p:txBody>
+      </p:sp>
+    </p:spTree>
+    <p:extLst>
+      <p:ext uri="{BB962C8B-B14F-4D97-AF65-F5344CB8AC3E}">
+        <p14:creationId xmlns:p14="http://schemas.microsoft.com/office/powerpoint/2010/main" val="4010638354"/>
+      </p:ext>
+    </p:extLst>
+  </p:cSld>
+  <p:clrMapOvr>
+    <a:masterClrMapping/>
+  </p:clrMapOvr>
+</p:sld>
+</file>
+
+<file path=ppt/slides/slide7.xml><?xml version="1.0" encoding="utf-8"?>
 <p:sld xmlns:a="http://schemas.openxmlformats.org/drawingml/2006/main" xmlns:r="http://schemas.openxmlformats.org/officeDocument/2006/relationships" xmlns:p="http://schemas.openxmlformats.org/presentationml/2006/main">
   <p:cSld>
     <p:spTree>

</xml_diff>